<commit_message>
fixing vstu -> vsu
</commit_message>
<xml_diff>
--- a/node_js.pptx
+++ b/node_js.pptx
@@ -125,6 +125,11 @@
       </a:defRPr>
     </a:lvl9pPr>
   </p:defaultTextStyle>
+  <p:extLst>
+    <p:ext uri="{EFAFB233-063F-42B5-8137-9DF3F51BA10A}">
+      <p15:sldGuideLst xmlns:p15="http://schemas.microsoft.com/office/powerpoint/2012/main"/>
+    </p:ext>
+  </p:extLst>
 </p:presentation>
 </file>
 
@@ -210,7 +215,7 @@
           <a:p>
             <a:fld id="{00D06C70-9140-41F3-8683-D2A3B089C0B7}" type="datetimeFigureOut">
               <a:rPr lang="ru-RU" smtClean="0"/>
-              <a:t>05.11.2017</a:t>
+              <a:t>13.11.2017</a:t>
             </a:fld>
             <a:endParaRPr lang="ru-RU"/>
           </a:p>
@@ -3307,7 +3312,7 @@
           <a:p>
             <a:fld id="{68B82F82-EBC3-43CB-AB7A-C9E99CB971C9}" type="datetimeFigureOut">
               <a:rPr lang="ru-RU" smtClean="0"/>
-              <a:t>05.11.2017</a:t>
+              <a:t>13.11.2017</a:t>
             </a:fld>
             <a:endParaRPr lang="ru-RU"/>
           </a:p>
@@ -3477,7 +3482,7 @@
           <a:p>
             <a:fld id="{68B82F82-EBC3-43CB-AB7A-C9E99CB971C9}" type="datetimeFigureOut">
               <a:rPr lang="ru-RU" smtClean="0"/>
-              <a:t>05.11.2017</a:t>
+              <a:t>13.11.2017</a:t>
             </a:fld>
             <a:endParaRPr lang="ru-RU"/>
           </a:p>
@@ -3657,7 +3662,7 @@
           <a:p>
             <a:fld id="{68B82F82-EBC3-43CB-AB7A-C9E99CB971C9}" type="datetimeFigureOut">
               <a:rPr lang="ru-RU" smtClean="0"/>
-              <a:t>05.11.2017</a:t>
+              <a:t>13.11.2017</a:t>
             </a:fld>
             <a:endParaRPr lang="ru-RU"/>
           </a:p>
@@ -3827,7 +3832,7 @@
           <a:p>
             <a:fld id="{68B82F82-EBC3-43CB-AB7A-C9E99CB971C9}" type="datetimeFigureOut">
               <a:rPr lang="ru-RU" smtClean="0"/>
-              <a:t>05.11.2017</a:t>
+              <a:t>13.11.2017</a:t>
             </a:fld>
             <a:endParaRPr lang="ru-RU"/>
           </a:p>
@@ -4071,7 +4076,7 @@
           <a:p>
             <a:fld id="{68B82F82-EBC3-43CB-AB7A-C9E99CB971C9}" type="datetimeFigureOut">
               <a:rPr lang="ru-RU" smtClean="0"/>
-              <a:t>05.11.2017</a:t>
+              <a:t>13.11.2017</a:t>
             </a:fld>
             <a:endParaRPr lang="ru-RU"/>
           </a:p>
@@ -4303,7 +4308,7 @@
           <a:p>
             <a:fld id="{68B82F82-EBC3-43CB-AB7A-C9E99CB971C9}" type="datetimeFigureOut">
               <a:rPr lang="ru-RU" smtClean="0"/>
-              <a:t>05.11.2017</a:t>
+              <a:t>13.11.2017</a:t>
             </a:fld>
             <a:endParaRPr lang="ru-RU"/>
           </a:p>
@@ -4670,7 +4675,7 @@
           <a:p>
             <a:fld id="{68B82F82-EBC3-43CB-AB7A-C9E99CB971C9}" type="datetimeFigureOut">
               <a:rPr lang="ru-RU" smtClean="0"/>
-              <a:t>05.11.2017</a:t>
+              <a:t>13.11.2017</a:t>
             </a:fld>
             <a:endParaRPr lang="ru-RU"/>
           </a:p>
@@ -4788,7 +4793,7 @@
           <a:p>
             <a:fld id="{68B82F82-EBC3-43CB-AB7A-C9E99CB971C9}" type="datetimeFigureOut">
               <a:rPr lang="ru-RU" smtClean="0"/>
-              <a:t>05.11.2017</a:t>
+              <a:t>13.11.2017</a:t>
             </a:fld>
             <a:endParaRPr lang="ru-RU"/>
           </a:p>
@@ -4883,7 +4888,7 @@
           <a:p>
             <a:fld id="{68B82F82-EBC3-43CB-AB7A-C9E99CB971C9}" type="datetimeFigureOut">
               <a:rPr lang="ru-RU" smtClean="0"/>
-              <a:t>05.11.2017</a:t>
+              <a:t>13.11.2017</a:t>
             </a:fld>
             <a:endParaRPr lang="ru-RU"/>
           </a:p>
@@ -5160,7 +5165,7 @@
           <a:p>
             <a:fld id="{68B82F82-EBC3-43CB-AB7A-C9E99CB971C9}" type="datetimeFigureOut">
               <a:rPr lang="ru-RU" smtClean="0"/>
-              <a:t>05.11.2017</a:t>
+              <a:t>13.11.2017</a:t>
             </a:fld>
             <a:endParaRPr lang="ru-RU"/>
           </a:p>
@@ -5417,7 +5422,7 @@
           <a:p>
             <a:fld id="{68B82F82-EBC3-43CB-AB7A-C9E99CB971C9}" type="datetimeFigureOut">
               <a:rPr lang="ru-RU" smtClean="0"/>
-              <a:t>05.11.2017</a:t>
+              <a:t>13.11.2017</a:t>
             </a:fld>
             <a:endParaRPr lang="ru-RU"/>
           </a:p>
@@ -5630,7 +5635,7 @@
           <a:p>
             <a:fld id="{68B82F82-EBC3-43CB-AB7A-C9E99CB971C9}" type="datetimeFigureOut">
               <a:rPr lang="ru-RU" smtClean="0"/>
-              <a:t>05.11.2017</a:t>
+              <a:t>13.11.2017</a:t>
             </a:fld>
             <a:endParaRPr lang="ru-RU"/>
           </a:p>
@@ -9248,7 +9253,13 @@
               <a:rPr lang="en-US" sz="2400" dirty="0" smtClean="0">
                 <a:hlinkClick r:id="rId6"/>
               </a:rPr>
-              <a:t>https://github.com/vitali-kviatkouski/vstu</a:t>
+              <a:t>https://</a:t>
+            </a:r>
+            <a:r>
+              <a:rPr lang="en-US" sz="2400" dirty="0" smtClean="0">
+                <a:hlinkClick r:id="rId6"/>
+              </a:rPr>
+              <a:t>github.com/vitali-kviatkouski/vsu</a:t>
             </a:r>
             <a:endParaRPr lang="en-US" sz="2400" dirty="0" smtClean="0"/>
           </a:p>

</xml_diff>

<commit_message>
Readme update + small change to presentation
</commit_message>
<xml_diff>
--- a/node_js.pptx
+++ b/node_js.pptx
@@ -808,11 +808,7 @@
           <a:p>
             <a:r>
               <a:rPr lang="ru-RU" baseline="0" dirty="0" smtClean="0"/>
-              <a:t>Опять </a:t>
-            </a:r>
-            <a:r>
-              <a:rPr lang="ru-RU" baseline="0" dirty="0" smtClean="0"/>
-              <a:t>же, мы будем двигаться итеративно. Для начала попробуем написать </a:t>
+              <a:t>Опять же, мы будем двигаться итеративно. Для начала попробуем написать </a:t>
             </a:r>
             <a:r>
               <a:rPr lang="en-US" baseline="0" dirty="0" smtClean="0"/>
@@ -852,11 +848,7 @@
             </a:r>
             <a:r>
               <a:rPr lang="ru-RU" baseline="0" dirty="0" smtClean="0"/>
-              <a:t>объяснить </a:t>
-            </a:r>
-            <a:r>
-              <a:rPr lang="ru-RU" baseline="0" dirty="0" smtClean="0"/>
-              <a:t>файл</a:t>
+              <a:t>объяснить файл</a:t>
             </a:r>
           </a:p>
           <a:p>
@@ -1102,21 +1094,13 @@
             </a:r>
             <a:r>
               <a:rPr lang="ru-RU" baseline="0" dirty="0" smtClean="0"/>
-              <a:t>написать попробовали, теперь забудьте про него</a:t>
-            </a:r>
-            <a:r>
-              <a:rPr lang="ru-RU" baseline="0" dirty="0" smtClean="0"/>
-              <a:t>. Точнее не забудьте, а скопируйте в новый файл (или переименуйте этот).</a:t>
-            </a:r>
-          </a:p>
-          <a:p>
-            <a:r>
-              <a:rPr lang="ru-RU" baseline="0" dirty="0" smtClean="0"/>
-              <a:t>Теперь </a:t>
-            </a:r>
-            <a:r>
-              <a:rPr lang="ru-RU" baseline="0" dirty="0" smtClean="0"/>
-              <a:t>мы напишем серверную и клиентскую часть для добавления маркеров в БД</a:t>
+              <a:t>написать попробовали, теперь забудьте про него. Точнее не забудьте, а скопируйте в новый файл (или переименуйте этот).</a:t>
+            </a:r>
+          </a:p>
+          <a:p>
+            <a:r>
+              <a:rPr lang="ru-RU" baseline="0" dirty="0" smtClean="0"/>
+              <a:t>Теперь мы напишем серверную и клиентскую часть для добавления маркеров в БД</a:t>
             </a:r>
           </a:p>
           <a:p>
@@ -1329,7 +1313,41 @@
             </a:pPr>
             <a:r>
               <a:rPr lang="ru-RU" baseline="0" dirty="0" smtClean="0"/>
-              <a:t>Запустите на выполнение</a:t>
+              <a:t>Создайте папку </a:t>
+            </a:r>
+            <a:r>
+              <a:rPr lang="en-US" baseline="0" dirty="0" smtClean="0"/>
+              <a:t>data/</a:t>
+            </a:r>
+            <a:r>
+              <a:rPr lang="en-US" baseline="0" dirty="0" err="1" smtClean="0"/>
+              <a:t>db</a:t>
+            </a:r>
+            <a:r>
+              <a:rPr lang="en-US" baseline="0" dirty="0" smtClean="0"/>
+              <a:t> </a:t>
+            </a:r>
+            <a:r>
+              <a:rPr lang="ru-RU" baseline="0" dirty="0" smtClean="0"/>
+              <a:t>в каталоге </a:t>
+            </a:r>
+            <a:r>
+              <a:rPr lang="ru-RU" baseline="0" smtClean="0"/>
+              <a:t>с файлами</a:t>
+            </a:r>
+            <a:endParaRPr lang="en-US" baseline="0" dirty="0" smtClean="0"/>
+          </a:p>
+          <a:p>
+            <a:pPr marL="228600" lvl="0" indent="-228600">
+              <a:buAutoNum type="arabicPeriod"/>
+            </a:pPr>
+            <a:r>
+              <a:rPr lang="ru-RU" baseline="0" dirty="0" smtClean="0"/>
+              <a:t>Запустите </a:t>
+            </a:r>
+            <a:r>
+              <a:rPr lang="ru-RU" baseline="0" dirty="0" smtClean="0"/>
+              <a:t>на выполнение</a:t>
             </a:r>
             <a:r>
               <a:rPr lang="en-US" baseline="0" dirty="0" smtClean="0"/>
@@ -1467,11 +1485,7 @@
           <a:p>
             <a:r>
               <a:rPr lang="ru-RU" baseline="0" dirty="0" smtClean="0"/>
-              <a:t>В клиентской части единственное изменение – это новая строка которая делает запрос к серверу</a:t>
-            </a:r>
-            <a:r>
-              <a:rPr lang="ru-RU" baseline="0" dirty="0" smtClean="0"/>
-              <a:t>.</a:t>
+              <a:t>В клиентской части единственное изменение – это новая строка которая делает запрос к серверу.</a:t>
             </a:r>
             <a:endParaRPr lang="en-US" baseline="0" dirty="0" smtClean="0"/>
           </a:p>
@@ -1632,19 +1646,7 @@
             </a:r>
             <a:r>
               <a:rPr lang="ru-RU" baseline="0" dirty="0" smtClean="0"/>
-              <a:t>который позволяет выполнять </a:t>
-            </a:r>
-            <a:r>
-              <a:rPr lang="ru-RU" baseline="0" dirty="0" smtClean="0"/>
-              <a:t>запросы </a:t>
-            </a:r>
-            <a:r>
-              <a:rPr lang="ru-RU" baseline="0" dirty="0" smtClean="0"/>
-              <a:t>к БД. Угадайте, на каком языке мы будем общаться</a:t>
-            </a:r>
-            <a:r>
-              <a:rPr lang="ru-RU" baseline="0" dirty="0" smtClean="0"/>
-              <a:t>?</a:t>
+              <a:t>который позволяет выполнять запросы к БД. Угадайте, на каком языке мы будем общаться?</a:t>
             </a:r>
             <a:endParaRPr lang="en-US" baseline="0" dirty="0" smtClean="0"/>
           </a:p>
@@ -1657,7 +1659,6 @@
               <a:rPr lang="ru-RU" baseline="0" dirty="0" smtClean="0"/>
               <a:t>рассказать про команды</a:t>
             </a:r>
-            <a:endParaRPr lang="ru-RU" baseline="0" dirty="0" smtClean="0"/>
           </a:p>
         </p:txBody>
       </p:sp>
@@ -1749,11 +1750,7 @@
           <a:p>
             <a:r>
               <a:rPr lang="ru-RU" baseline="0" dirty="0" smtClean="0"/>
-              <a:t>Давайте теперь попробуем загружать точки при загрузке </a:t>
-            </a:r>
-            <a:r>
-              <a:rPr lang="ru-RU" baseline="0" dirty="0" smtClean="0"/>
-              <a:t>страницы – </a:t>
+              <a:t>Давайте теперь попробуем загружать точки при загрузке страницы – </a:t>
             </a:r>
             <a:r>
               <a:rPr lang="ru-RU" baseline="0" dirty="0" err="1" smtClean="0"/>
@@ -1871,7 +1868,6 @@
               <a:rPr lang="ru-RU" baseline="0" dirty="0" smtClean="0"/>
               <a:t>)</a:t>
             </a:r>
-            <a:endParaRPr lang="ru-RU" baseline="0" dirty="0" smtClean="0"/>
           </a:p>
           <a:p>
             <a:r>
@@ -1894,7 +1890,6 @@
               <a:rPr lang="ru-RU" baseline="0" dirty="0" smtClean="0"/>
               <a:t>ответ со списком точек. обратите внимание также на лог сервера – там пишется когда мы запрашивали список точек</a:t>
             </a:r>
-            <a:endParaRPr lang="ru-RU" baseline="0" dirty="0" smtClean="0"/>
           </a:p>
         </p:txBody>
       </p:sp>
@@ -2005,19 +2000,7 @@
             </a:r>
             <a:r>
               <a:rPr lang="ru-RU" baseline="0" dirty="0" smtClean="0"/>
-              <a:t>Жирным выделены изменения. Часть </a:t>
-            </a:r>
-            <a:r>
-              <a:rPr lang="ru-RU" baseline="0" dirty="0" smtClean="0"/>
-              <a:t>кода уже написанного </a:t>
-            </a:r>
-            <a:r>
-              <a:rPr lang="ru-RU" baseline="0" dirty="0" smtClean="0"/>
-              <a:t>я опустил чтобы вместить на </a:t>
-            </a:r>
-            <a:r>
-              <a:rPr lang="ru-RU" baseline="0" dirty="0" smtClean="0"/>
-              <a:t>слайд</a:t>
+              <a:t>Жирным выделены изменения. Часть кода уже написанного я опустил чтобы вместить на слайд</a:t>
             </a:r>
           </a:p>
           <a:p>
@@ -2144,7 +2127,6 @@
               <a:rPr lang="ru-RU" baseline="0" dirty="0" smtClean="0"/>
               <a:t> сервер и обновить страницу</a:t>
             </a:r>
-            <a:endParaRPr lang="ru-RU" baseline="0" dirty="0" smtClean="0"/>
           </a:p>
           <a:p>
             <a:endParaRPr lang="ru-RU" baseline="0" dirty="0" smtClean="0"/>
@@ -3240,11 +3222,7 @@
             </a:r>
             <a:r>
               <a:rPr lang="ru-RU" baseline="0" dirty="0" smtClean="0"/>
-              <a:t> </a:t>
-            </a:r>
-            <a:r>
-              <a:rPr lang="ru-RU" baseline="0" dirty="0" smtClean="0"/>
-              <a:t>понадобится создать несколько файлов: 1) </a:t>
+              <a:t> понадобится создать несколько файлов: 1) </a:t>
             </a:r>
             <a:r>
               <a:rPr lang="en-US" baseline="0" dirty="0" smtClean="0"/>
@@ -3260,11 +3238,7 @@
             </a:r>
             <a:r>
               <a:rPr lang="en-US" baseline="0" dirty="0" smtClean="0"/>
-              <a:t> </a:t>
-            </a:r>
-            <a:r>
-              <a:rPr lang="en-US" baseline="0" dirty="0" smtClean="0"/>
-              <a:t>file</a:t>
+              <a:t> file</a:t>
             </a:r>
           </a:p>
           <a:p>
@@ -3292,11 +3266,7 @@
             </a:r>
             <a:r>
               <a:rPr lang="ru-RU" baseline="0" dirty="0" smtClean="0"/>
-              <a:t>объяснить </a:t>
-            </a:r>
-            <a:r>
-              <a:rPr lang="ru-RU" baseline="0" dirty="0" smtClean="0"/>
-              <a:t>содержимое. Ключевой акцент на подключение </a:t>
+              <a:t>объяснить содержимое. Ключевой акцент на подключение </a:t>
             </a:r>
             <a:r>
               <a:rPr lang="en-US" baseline="0" dirty="0" err="1" smtClean="0"/>
@@ -3393,11 +3363,7 @@
             </a:r>
             <a:r>
               <a:rPr lang="ru-RU" baseline="0" dirty="0" smtClean="0"/>
-              <a:t>объяснить </a:t>
-            </a:r>
-            <a:r>
-              <a:rPr lang="ru-RU" baseline="0" dirty="0" smtClean="0"/>
-              <a:t>содержимое</a:t>
+              <a:t>объяснить содержимое</a:t>
             </a:r>
           </a:p>
           <a:p>
@@ -3409,7 +3375,6 @@
               <a:rPr lang="ru-RU" baseline="0" dirty="0" smtClean="0"/>
               <a:t>Основной акцент на координатах – что это координаты ВГУ</a:t>
             </a:r>
-            <a:endParaRPr lang="ru-RU" baseline="0" dirty="0" smtClean="0"/>
           </a:p>
           <a:p>
             <a:pPr marL="228600" indent="-228600">
@@ -3556,11 +3521,7 @@
             </a:r>
             <a:r>
               <a:rPr lang="ru-RU" baseline="0" dirty="0" smtClean="0"/>
-              <a:t> файл </a:t>
-            </a:r>
-            <a:r>
-              <a:rPr lang="ru-RU" baseline="0" dirty="0" smtClean="0"/>
-              <a:t>как показано на слайде</a:t>
+              <a:t> файл как показано на слайде</a:t>
             </a:r>
             <a:r>
               <a:rPr lang="en-US" baseline="0" dirty="0" smtClean="0"/>
@@ -3576,11 +3537,7 @@
             </a:r>
             <a:r>
               <a:rPr lang="ru-RU" baseline="0" dirty="0" smtClean="0"/>
-              <a:t>файл. </a:t>
-            </a:r>
-            <a:r>
-              <a:rPr lang="ru-RU" baseline="0" dirty="0" smtClean="0"/>
-              <a:t>Здесь</a:t>
+              <a:t>файл. Здесь</a:t>
             </a:r>
           </a:p>
           <a:p>
@@ -3621,11 +3578,7 @@
             </a:pPr>
             <a:r>
               <a:rPr lang="ru-RU" baseline="0" dirty="0" smtClean="0"/>
-              <a:t>Попробуйте </a:t>
-            </a:r>
-            <a:r>
-              <a:rPr lang="ru-RU" baseline="0" dirty="0" smtClean="0"/>
-              <a:t>пощелкать на карте, теперь вы можете добавлять новые маркеры на карту</a:t>
+              <a:t>Попробуйте пощелкать на карте, теперь вы можете добавлять новые маркеры на карту</a:t>
             </a:r>
             <a:endParaRPr lang="ru-RU" dirty="0"/>
           </a:p>
@@ -3717,11 +3670,7 @@
             </a:r>
             <a:r>
               <a:rPr lang="ru-RU" baseline="0" dirty="0" smtClean="0"/>
-              <a:t> попробуем удалить маркеры с </a:t>
-            </a:r>
-            <a:r>
-              <a:rPr lang="ru-RU" baseline="0" dirty="0" smtClean="0"/>
-              <a:t>карты</a:t>
+              <a:t> попробуем удалить маркеры с карты</a:t>
             </a:r>
           </a:p>
           <a:p>
@@ -4066,11 +4015,7 @@
           <a:p>
             <a:r>
               <a:rPr lang="ru-RU" dirty="0" smtClean="0"/>
-              <a:t>Со </a:t>
-            </a:r>
-            <a:r>
-              <a:rPr lang="ru-RU" dirty="0" smtClean="0"/>
-              <a:t>стандартным</a:t>
+              <a:t>Со стандартным</a:t>
             </a:r>
             <a:r>
               <a:rPr lang="ru-RU" baseline="0" dirty="0" smtClean="0"/>
@@ -8349,15 +8294,7 @@
           <a:p>
             <a:r>
               <a:rPr lang="en-US" sz="2800" dirty="0" smtClean="0"/>
-              <a:t>node </a:t>
-            </a:r>
-            <a:r>
-              <a:rPr lang="en-US" sz="2800" dirty="0" smtClean="0"/>
-              <a:t>hello</a:t>
-            </a:r>
-            <a:r>
-              <a:rPr lang="en-US" sz="2800" dirty="0" smtClean="0"/>
-              <a:t>.js</a:t>
+              <a:t>node hello.js</a:t>
             </a:r>
             <a:endParaRPr lang="ru-RU" sz="2800" dirty="0"/>
           </a:p>
@@ -8952,7 +8889,7 @@
         </p:nvSpPr>
         <p:spPr>
           <a:xfrm>
-            <a:off x="4714351" y="4823505"/>
+            <a:off x="4714351" y="4903889"/>
             <a:ext cx="4409605" cy="523220"/>
           </a:xfrm>
           <a:prstGeom prst="rect">
@@ -8996,6 +8933,51 @@
             <a:r>
               <a:rPr lang="en-US" sz="2800" dirty="0" err="1" smtClean="0"/>
               <a:t>mongo.conf</a:t>
+            </a:r>
+            <a:endParaRPr lang="ru-RU" sz="2800" dirty="0"/>
+          </a:p>
+        </p:txBody>
+      </p:sp>
+      <p:sp>
+        <p:nvSpPr>
+          <p:cNvPr id="7" name="TextBox 6"/>
+          <p:cNvSpPr txBox="1"/>
+          <p:nvPr/>
+        </p:nvSpPr>
+        <p:spPr>
+          <a:xfrm>
+            <a:off x="4714299" y="4282416"/>
+            <a:ext cx="2265492" cy="523220"/>
+          </a:xfrm>
+          <a:prstGeom prst="rect">
+            <a:avLst/>
+          </a:prstGeom>
+          <a:noFill/>
+          <a:ln>
+            <a:solidFill>
+              <a:schemeClr val="accent6">
+                <a:shade val="50000"/>
+              </a:schemeClr>
+            </a:solidFill>
+          </a:ln>
+        </p:spPr>
+        <p:txBody>
+          <a:bodyPr wrap="none" rtlCol="0">
+            <a:spAutoFit/>
+          </a:bodyPr>
+          <a:lstStyle/>
+          <a:p>
+            <a:r>
+              <a:rPr lang="en-US" sz="2800" dirty="0" err="1" smtClean="0"/>
+              <a:t>mkdir</a:t>
+            </a:r>
+            <a:r>
+              <a:rPr lang="en-US" sz="2800" dirty="0" smtClean="0"/>
+              <a:t> data/</a:t>
+            </a:r>
+            <a:r>
+              <a:rPr lang="en-US" sz="2800" dirty="0" err="1" smtClean="0"/>
+              <a:t>db</a:t>
             </a:r>
             <a:endParaRPr lang="ru-RU" sz="2800" dirty="0"/>
           </a:p>

</xml_diff>

<commit_message>
Fixed mongodb path in pptx
</commit_message>
<xml_diff>
--- a/node_js.pptx
+++ b/node_js.pptx
@@ -217,7 +217,7 @@
           <a:p>
             <a:fld id="{00D06C70-9140-41F3-8683-D2A3B089C0B7}" type="datetimeFigureOut">
               <a:rPr lang="ru-RU" smtClean="0"/>
-              <a:t>14.11.2017</a:t>
+              <a:t>15.11.2017</a:t>
             </a:fld>
             <a:endParaRPr lang="ru-RU"/>
           </a:p>
@@ -1318,7 +1318,7 @@
             </a:r>
             <a:r>
               <a:rPr lang="en-US" baseline="0" dirty="0" smtClean="0"/>
-              <a:t>data/</a:t>
+              <a:t>data-</a:t>
             </a:r>
             <a:r>
               <a:rPr lang="en-US" baseline="0" dirty="0" err="1" smtClean="0"/>
@@ -1330,11 +1330,7 @@
             </a:r>
             <a:r>
               <a:rPr lang="ru-RU" baseline="0" dirty="0" smtClean="0"/>
-              <a:t>в каталоге </a:t>
-            </a:r>
-            <a:r>
-              <a:rPr lang="ru-RU" baseline="0" smtClean="0"/>
-              <a:t>с файлами</a:t>
+              <a:t>в каталоге с файлами</a:t>
             </a:r>
             <a:endParaRPr lang="en-US" baseline="0" dirty="0" smtClean="0"/>
           </a:p>
@@ -3235,10 +3231,9 @@
               <a:defRPr/>
             </a:pPr>
             <a:r>
-              <a:rPr lang="ru-RU" baseline="0" smtClean="0"/>
+              <a:rPr lang="ru-RU" baseline="0" dirty="0" smtClean="0"/>
               <a:t>Удаление точек</a:t>
             </a:r>
-            <a:endParaRPr lang="ru-RU" baseline="0" dirty="0" smtClean="0"/>
           </a:p>
         </p:txBody>
       </p:sp>
@@ -4577,7 +4572,7 @@
           <a:p>
             <a:fld id="{68B82F82-EBC3-43CB-AB7A-C9E99CB971C9}" type="datetimeFigureOut">
               <a:rPr lang="ru-RU" smtClean="0"/>
-              <a:t>14.11.2017</a:t>
+              <a:t>15.11.2017</a:t>
             </a:fld>
             <a:endParaRPr lang="ru-RU"/>
           </a:p>
@@ -4747,7 +4742,7 @@
           <a:p>
             <a:fld id="{68B82F82-EBC3-43CB-AB7A-C9E99CB971C9}" type="datetimeFigureOut">
               <a:rPr lang="ru-RU" smtClean="0"/>
-              <a:t>14.11.2017</a:t>
+              <a:t>15.11.2017</a:t>
             </a:fld>
             <a:endParaRPr lang="ru-RU"/>
           </a:p>
@@ -4927,7 +4922,7 @@
           <a:p>
             <a:fld id="{68B82F82-EBC3-43CB-AB7A-C9E99CB971C9}" type="datetimeFigureOut">
               <a:rPr lang="ru-RU" smtClean="0"/>
-              <a:t>14.11.2017</a:t>
+              <a:t>15.11.2017</a:t>
             </a:fld>
             <a:endParaRPr lang="ru-RU"/>
           </a:p>
@@ -5097,7 +5092,7 @@
           <a:p>
             <a:fld id="{68B82F82-EBC3-43CB-AB7A-C9E99CB971C9}" type="datetimeFigureOut">
               <a:rPr lang="ru-RU" smtClean="0"/>
-              <a:t>14.11.2017</a:t>
+              <a:t>15.11.2017</a:t>
             </a:fld>
             <a:endParaRPr lang="ru-RU"/>
           </a:p>
@@ -5341,7 +5336,7 @@
           <a:p>
             <a:fld id="{68B82F82-EBC3-43CB-AB7A-C9E99CB971C9}" type="datetimeFigureOut">
               <a:rPr lang="ru-RU" smtClean="0"/>
-              <a:t>14.11.2017</a:t>
+              <a:t>15.11.2017</a:t>
             </a:fld>
             <a:endParaRPr lang="ru-RU"/>
           </a:p>
@@ -5573,7 +5568,7 @@
           <a:p>
             <a:fld id="{68B82F82-EBC3-43CB-AB7A-C9E99CB971C9}" type="datetimeFigureOut">
               <a:rPr lang="ru-RU" smtClean="0"/>
-              <a:t>14.11.2017</a:t>
+              <a:t>15.11.2017</a:t>
             </a:fld>
             <a:endParaRPr lang="ru-RU"/>
           </a:p>
@@ -5940,7 +5935,7 @@
           <a:p>
             <a:fld id="{68B82F82-EBC3-43CB-AB7A-C9E99CB971C9}" type="datetimeFigureOut">
               <a:rPr lang="ru-RU" smtClean="0"/>
-              <a:t>14.11.2017</a:t>
+              <a:t>15.11.2017</a:t>
             </a:fld>
             <a:endParaRPr lang="ru-RU"/>
           </a:p>
@@ -6058,7 +6053,7 @@
           <a:p>
             <a:fld id="{68B82F82-EBC3-43CB-AB7A-C9E99CB971C9}" type="datetimeFigureOut">
               <a:rPr lang="ru-RU" smtClean="0"/>
-              <a:t>14.11.2017</a:t>
+              <a:t>15.11.2017</a:t>
             </a:fld>
             <a:endParaRPr lang="ru-RU"/>
           </a:p>
@@ -6153,7 +6148,7 @@
           <a:p>
             <a:fld id="{68B82F82-EBC3-43CB-AB7A-C9E99CB971C9}" type="datetimeFigureOut">
               <a:rPr lang="ru-RU" smtClean="0"/>
-              <a:t>14.11.2017</a:t>
+              <a:t>15.11.2017</a:t>
             </a:fld>
             <a:endParaRPr lang="ru-RU"/>
           </a:p>
@@ -6430,7 +6425,7 @@
           <a:p>
             <a:fld id="{68B82F82-EBC3-43CB-AB7A-C9E99CB971C9}" type="datetimeFigureOut">
               <a:rPr lang="ru-RU" smtClean="0"/>
-              <a:t>14.11.2017</a:t>
+              <a:t>15.11.2017</a:t>
             </a:fld>
             <a:endParaRPr lang="ru-RU"/>
           </a:p>
@@ -6687,7 +6682,7 @@
           <a:p>
             <a:fld id="{68B82F82-EBC3-43CB-AB7A-C9E99CB971C9}" type="datetimeFigureOut">
               <a:rPr lang="ru-RU" smtClean="0"/>
-              <a:t>14.11.2017</a:t>
+              <a:t>15.11.2017</a:t>
             </a:fld>
             <a:endParaRPr lang="ru-RU"/>
           </a:p>
@@ -6900,7 +6895,7 @@
           <a:p>
             <a:fld id="{68B82F82-EBC3-43CB-AB7A-C9E99CB971C9}" type="datetimeFigureOut">
               <a:rPr lang="ru-RU" smtClean="0"/>
-              <a:t>14.11.2017</a:t>
+              <a:t>15.11.2017</a:t>
             </a:fld>
             <a:endParaRPr lang="ru-RU"/>
           </a:p>
@@ -9161,7 +9156,7 @@
         <p:spPr>
           <a:xfrm>
             <a:off x="4714299" y="4282416"/>
-            <a:ext cx="2265492" cy="523220"/>
+            <a:ext cx="2236638" cy="523220"/>
           </a:xfrm>
           <a:prstGeom prst="rect">
             <a:avLst/>
@@ -9187,7 +9182,11 @@
             </a:r>
             <a:r>
               <a:rPr lang="en-US" sz="2800" dirty="0" smtClean="0"/>
-              <a:t> data/</a:t>
+              <a:t> </a:t>
+            </a:r>
+            <a:r>
+              <a:rPr lang="en-US" sz="2800" dirty="0" smtClean="0"/>
+              <a:t>data-</a:t>
             </a:r>
             <a:r>
               <a:rPr lang="en-US" sz="2800" dirty="0" err="1" smtClean="0"/>

</xml_diff>